<commit_message>
chore: first day of work on dissertation document
</commit_message>
<xml_diff>
--- a/documentation/university/presentation/250822 - Presentation (Short).pptx
+++ b/documentation/university/presentation/250822 - Presentation (Short).pptx
@@ -7888,6 +7888,14 @@
               <a:rPr lang="en-GB" dirty="0"/>
               <a:t>Final Detailed Workflow</a:t>
             </a:r>
+            <a:br>
+              <a:rPr lang="en-GB" dirty="0"/>
+            </a:br>
+            <a:r>
+              <a:rPr lang="en-GB" sz="2400" b="0" dirty="0"/>
+              <a:t>Models used: o4-mini and gpt-4o-mini</a:t>
+            </a:r>
+            <a:endParaRPr lang="en-GB" b="0" dirty="0"/>
           </a:p>
         </p:txBody>
       </p:sp>

</xml_diff>